<commit_message>
added to presentation powerpoint
</commit_message>
<xml_diff>
--- a/project/presentation/PresentationPowerPoint.pptx
+++ b/project/presentation/PresentationPowerPoint.pptx
@@ -6,20 +6,22 @@
   </p:sldMasterIdLst>
   <p:sldIdLst>
     <p:sldId id="256" r:id="rId2"/>
-    <p:sldId id="257" r:id="rId3"/>
-    <p:sldId id="269" r:id="rId4"/>
+    <p:sldId id="269" r:id="rId3"/>
+    <p:sldId id="257" r:id="rId4"/>
     <p:sldId id="270" r:id="rId5"/>
     <p:sldId id="258" r:id="rId6"/>
     <p:sldId id="259" r:id="rId7"/>
     <p:sldId id="260" r:id="rId8"/>
     <p:sldId id="261" r:id="rId9"/>
-    <p:sldId id="262" r:id="rId10"/>
-    <p:sldId id="263" r:id="rId11"/>
-    <p:sldId id="264" r:id="rId12"/>
-    <p:sldId id="265" r:id="rId13"/>
-    <p:sldId id="266" r:id="rId14"/>
-    <p:sldId id="267" r:id="rId15"/>
-    <p:sldId id="268" r:id="rId16"/>
+    <p:sldId id="272" r:id="rId10"/>
+    <p:sldId id="262" r:id="rId11"/>
+    <p:sldId id="263" r:id="rId12"/>
+    <p:sldId id="264" r:id="rId13"/>
+    <p:sldId id="265" r:id="rId14"/>
+    <p:sldId id="271" r:id="rId15"/>
+    <p:sldId id="266" r:id="rId16"/>
+    <p:sldId id="267" r:id="rId17"/>
+    <p:sldId id="268" r:id="rId18"/>
   </p:sldIdLst>
   <p:sldSz cx="9144000" cy="6858000" type="screen4x3"/>
   <p:notesSz cx="6858000" cy="9144000"/>
@@ -3838,7 +3840,94 @@
           <a:bodyPr/>
           <a:lstStyle/>
           <a:p>
-            <a:endParaRPr lang="fr-FR"/>
+            <a:pPr>
+              <a:buFont typeface="Arial"/>
+              <a:buChar char="•"/>
+            </a:pPr>
+            <a:r>
+              <a:rPr lang="fr-FR" dirty="0" err="1" smtClean="0"/>
+              <a:t>Based</a:t>
+            </a:r>
+            <a:r>
+              <a:rPr lang="fr-FR" dirty="0" smtClean="0"/>
+              <a:t> </a:t>
+            </a:r>
+            <a:r>
+              <a:rPr lang="fr-FR" smtClean="0"/>
+              <a:t>on pair-wise</a:t>
+            </a:r>
+            <a:r>
+              <a:rPr lang="fr-FR" dirty="0" smtClean="0"/>
+              <a:t> </a:t>
+            </a:r>
+            <a:r>
+              <a:rPr lang="fr-FR" dirty="0" err="1" smtClean="0"/>
+              <a:t>Bottleneck</a:t>
+            </a:r>
+            <a:r>
+              <a:rPr lang="fr-FR" dirty="0" smtClean="0"/>
+              <a:t> distance matrix</a:t>
+            </a:r>
+            <a:endParaRPr lang="fr-FR" dirty="0" smtClean="0"/>
+          </a:p>
+          <a:p>
+            <a:pPr>
+              <a:buFont typeface="Arial"/>
+              <a:buChar char="•"/>
+            </a:pPr>
+            <a:r>
+              <a:rPr lang="fr-FR" dirty="0" err="1" smtClean="0"/>
+              <a:t>kMeans</a:t>
+            </a:r>
+            <a:r>
+              <a:rPr lang="fr-FR" dirty="0" smtClean="0"/>
+              <a:t>:</a:t>
+            </a:r>
+          </a:p>
+          <a:p>
+            <a:pPr>
+              <a:buFont typeface="Arial"/>
+              <a:buChar char="•"/>
+            </a:pPr>
+            <a:r>
+              <a:rPr lang="fr-FR" dirty="0" err="1" smtClean="0"/>
+              <a:t>kMedoid</a:t>
+            </a:r>
+            <a:r>
+              <a:rPr lang="fr-FR" dirty="0" smtClean="0"/>
+              <a:t>:</a:t>
+            </a:r>
+          </a:p>
+          <a:p>
+            <a:pPr>
+              <a:buFont typeface="Arial"/>
+              <a:buChar char="•"/>
+            </a:pPr>
+            <a:r>
+              <a:rPr lang="fr-FR" dirty="0" smtClean="0"/>
+              <a:t>Visualisation via multi-</a:t>
+            </a:r>
+            <a:r>
+              <a:rPr lang="fr-FR" dirty="0" err="1" smtClean="0"/>
+              <a:t>d</a:t>
+            </a:r>
+            <a:r>
+              <a:rPr lang="fr-FR" dirty="0" err="1" smtClean="0"/>
+              <a:t>imensional</a:t>
+            </a:r>
+            <a:r>
+              <a:rPr lang="fr-FR" dirty="0" smtClean="0"/>
+              <a:t> </a:t>
+            </a:r>
+            <a:r>
+              <a:rPr lang="fr-FR" dirty="0" err="1" smtClean="0"/>
+              <a:t>scaling</a:t>
+            </a:r>
+            <a:r>
+              <a:rPr lang="fr-FR" dirty="0"/>
+              <a:t>.</a:t>
+            </a:r>
+            <a:endParaRPr lang="fr-FR" dirty="0"/>
           </a:p>
         </p:txBody>
       </p:sp>
@@ -3860,31 +3949,12 @@
           <a:lstStyle/>
           <a:p>
             <a:r>
-              <a:rPr lang="fr-FR" dirty="0" err="1" smtClean="0"/>
-              <a:t>Results</a:t>
-            </a:r>
-            <a:r>
-              <a:rPr lang="fr-FR" dirty="0"/>
-              <a:t/>
-            </a:r>
-            <a:br>
-              <a:rPr lang="fr-FR" dirty="0"/>
-            </a:br>
-            <a:r>
-              <a:rPr lang="fr-FR" dirty="0" err="1" smtClean="0"/>
-              <a:t>Nearest</a:t>
-            </a:r>
-            <a:r>
-              <a:rPr lang="fr-FR" dirty="0" smtClean="0"/>
-              <a:t> in </a:t>
-            </a:r>
-            <a:r>
-              <a:rPr lang="fr-FR" dirty="0" err="1" smtClean="0"/>
-              <a:t>Bottleneck</a:t>
-            </a:r>
-            <a:r>
-              <a:rPr lang="fr-FR" dirty="0" smtClean="0"/>
-              <a:t> Distance</a:t>
+              <a:rPr lang="fr-FR" dirty="0" smtClean="0"/>
+              <a:t>Classification via </a:t>
+            </a:r>
+            <a:r>
+              <a:rPr lang="fr-FR" dirty="0" err="1" smtClean="0"/>
+              <a:t>Clustering</a:t>
             </a:r>
             <a:endParaRPr lang="fr-FR" dirty="0"/>
           </a:p>
@@ -3893,7 +3963,7 @@
     </p:spTree>
     <p:extLst>
       <p:ext uri="{BB962C8B-B14F-4D97-AF65-F5344CB8AC3E}">
-        <p14:creationId xmlns:p14="http://schemas.microsoft.com/office/powerpoint/2010/main" val="2758726464"/>
+        <p14:creationId xmlns:p14="http://schemas.microsoft.com/office/powerpoint/2010/main" val="2684406465"/>
       </p:ext>
     </p:extLst>
   </p:cSld>
@@ -3952,61 +4022,49 @@
         <p:spPr/>
         <p:txBody>
           <a:bodyPr>
-            <a:normAutofit fontScale="90000"/>
+            <a:noAutofit/>
           </a:bodyPr>
           <a:lstStyle/>
           <a:p>
             <a:r>
-              <a:rPr lang="fr-FR" dirty="0" err="1" smtClean="0"/>
+              <a:rPr lang="fr-FR" sz="3600" dirty="0" err="1" smtClean="0"/>
               <a:t>Results</a:t>
             </a:r>
             <a:r>
-              <a:rPr lang="fr-FR" dirty="0" smtClean="0"/>
+              <a:rPr lang="fr-FR" sz="3600" dirty="0" smtClean="0"/>
+              <a:t>:</a:t>
+            </a:r>
+            <a:r>
+              <a:rPr lang="fr-FR" sz="3600" dirty="0"/>
               <a:t/>
             </a:r>
             <a:br>
-              <a:rPr lang="fr-FR" dirty="0" smtClean="0"/>
+              <a:rPr lang="fr-FR" sz="3600" dirty="0"/>
             </a:br>
             <a:r>
-              <a:rPr lang="fr-FR" sz="2700" dirty="0" smtClean="0"/>
-              <a:t>Multi-</a:t>
-            </a:r>
-            <a:r>
-              <a:rPr lang="fr-FR" sz="2700" dirty="0" err="1" smtClean="0"/>
-              <a:t>Dimensional</a:t>
-            </a:r>
-            <a:r>
-              <a:rPr lang="fr-FR" sz="2700" dirty="0" smtClean="0"/>
-              <a:t> </a:t>
-            </a:r>
-            <a:r>
-              <a:rPr lang="fr-FR" sz="2700" dirty="0" err="1" smtClean="0"/>
-              <a:t>Scaling</a:t>
-            </a:r>
-            <a:r>
-              <a:rPr lang="fr-FR" sz="2700" dirty="0" smtClean="0"/>
-              <a:t> and </a:t>
-            </a:r>
-            <a:r>
-              <a:rPr lang="fr-FR" sz="2700" dirty="0" err="1" smtClean="0"/>
-              <a:t>kMeans</a:t>
-            </a:r>
-            <a:r>
-              <a:rPr lang="fr-FR" sz="2700" dirty="0" smtClean="0"/>
-              <a:t> </a:t>
-            </a:r>
-            <a:r>
-              <a:rPr lang="fr-FR" sz="2700" dirty="0" err="1" smtClean="0"/>
-              <a:t>Clustering</a:t>
-            </a:r>
-            <a:endParaRPr lang="fr-FR" sz="2700" dirty="0"/>
+              <a:rPr lang="fr-FR" sz="2800" dirty="0" err="1" smtClean="0"/>
+              <a:t>Nearest</a:t>
+            </a:r>
+            <a:r>
+              <a:rPr lang="fr-FR" sz="2800" dirty="0" smtClean="0"/>
+              <a:t> in </a:t>
+            </a:r>
+            <a:r>
+              <a:rPr lang="fr-FR" sz="2800" dirty="0" err="1" smtClean="0"/>
+              <a:t>Bottleneck</a:t>
+            </a:r>
+            <a:r>
+              <a:rPr lang="fr-FR" sz="2800" dirty="0" smtClean="0"/>
+              <a:t> Distance</a:t>
+            </a:r>
+            <a:endParaRPr lang="fr-FR" sz="2800" dirty="0"/>
           </a:p>
         </p:txBody>
       </p:sp>
     </p:spTree>
     <p:extLst>
       <p:ext uri="{BB962C8B-B14F-4D97-AF65-F5344CB8AC3E}">
-        <p14:creationId xmlns:p14="http://schemas.microsoft.com/office/powerpoint/2010/main" val="3439006"/>
+        <p14:creationId xmlns:p14="http://schemas.microsoft.com/office/powerpoint/2010/main" val="2758726464"/>
       </p:ext>
     </p:extLst>
   </p:cSld>
@@ -4062,7 +4120,12 @@
             <p:ph type="title"/>
           </p:nvPr>
         </p:nvSpPr>
-        <p:spPr/>
+        <p:spPr>
+          <a:xfrm>
+            <a:off x="777240" y="4876800"/>
+            <a:ext cx="7807960" cy="914400"/>
+          </a:xfrm>
+        </p:spPr>
         <p:txBody>
           <a:bodyPr>
             <a:normAutofit fontScale="90000"/>
@@ -4075,51 +4138,55 @@
             </a:r>
             <a:r>
               <a:rPr lang="fr-FR" dirty="0" smtClean="0"/>
+              <a:t>:</a:t>
+            </a:r>
+            <a:r>
+              <a:rPr lang="fr-FR" dirty="0" smtClean="0"/>
               <a:t/>
             </a:r>
             <a:br>
               <a:rPr lang="fr-FR" dirty="0" smtClean="0"/>
             </a:br>
             <a:r>
-              <a:rPr lang="fr-FR" sz="2800" dirty="0" smtClean="0"/>
+              <a:rPr lang="fr-FR" sz="2900" dirty="0" smtClean="0"/>
               <a:t>Multi-</a:t>
             </a:r>
             <a:r>
-              <a:rPr lang="fr-FR" sz="2800" dirty="0" err="1" smtClean="0"/>
+              <a:rPr lang="fr-FR" sz="2900" dirty="0" err="1" smtClean="0"/>
               <a:t>Dimensional</a:t>
             </a:r>
             <a:r>
-              <a:rPr lang="fr-FR" sz="2800" dirty="0" smtClean="0"/>
+              <a:rPr lang="fr-FR" sz="2900" dirty="0" smtClean="0"/>
               <a:t> </a:t>
             </a:r>
             <a:r>
-              <a:rPr lang="fr-FR" sz="2800" dirty="0" err="1" smtClean="0"/>
+              <a:rPr lang="fr-FR" sz="2900" dirty="0" err="1" smtClean="0"/>
               <a:t>Scaling</a:t>
             </a:r>
             <a:r>
-              <a:rPr lang="fr-FR" sz="2800" dirty="0" smtClean="0"/>
+              <a:rPr lang="fr-FR" sz="2900" dirty="0" smtClean="0"/>
               <a:t> and </a:t>
             </a:r>
             <a:r>
-              <a:rPr lang="fr-FR" sz="2800" dirty="0" err="1" smtClean="0"/>
-              <a:t>kMedoid</a:t>
-            </a:r>
-            <a:r>
-              <a:rPr lang="fr-FR" sz="2800" dirty="0" smtClean="0"/>
+              <a:rPr lang="fr-FR" sz="2900" dirty="0" err="1" smtClean="0"/>
+              <a:t>kMeans</a:t>
+            </a:r>
+            <a:r>
+              <a:rPr lang="fr-FR" sz="2900" dirty="0" smtClean="0"/>
               <a:t> </a:t>
             </a:r>
             <a:r>
-              <a:rPr lang="fr-FR" sz="2800" dirty="0" err="1" smtClean="0"/>
+              <a:rPr lang="fr-FR" sz="2900" dirty="0" err="1" smtClean="0"/>
               <a:t>Clustering</a:t>
             </a:r>
-            <a:endParaRPr lang="fr-FR" sz="2800" dirty="0"/>
+            <a:endParaRPr lang="fr-FR" sz="2900" dirty="0"/>
           </a:p>
         </p:txBody>
       </p:sp>
     </p:spTree>
     <p:extLst>
       <p:ext uri="{BB962C8B-B14F-4D97-AF65-F5344CB8AC3E}">
-        <p14:creationId xmlns:p14="http://schemas.microsoft.com/office/powerpoint/2010/main" val="540028329"/>
+        <p14:creationId xmlns:p14="http://schemas.microsoft.com/office/powerpoint/2010/main" val="3439006"/>
       </p:ext>
     </p:extLst>
   </p:cSld>
@@ -4177,21 +4244,62 @@
         </p:nvSpPr>
         <p:spPr/>
         <p:txBody>
-          <a:bodyPr/>
-          <a:lstStyle/>
-          <a:p>
-            <a:r>
-              <a:rPr lang="fr-FR" dirty="0" smtClean="0"/>
-              <a:t>Future Directions</a:t>
-            </a:r>
-            <a:endParaRPr lang="fr-FR" dirty="0"/>
+          <a:bodyPr>
+            <a:normAutofit fontScale="90000"/>
+          </a:bodyPr>
+          <a:lstStyle/>
+          <a:p>
+            <a:r>
+              <a:rPr lang="fr-FR" dirty="0" err="1" smtClean="0"/>
+              <a:t>Results</a:t>
+            </a:r>
+            <a:r>
+              <a:rPr lang="fr-FR" dirty="0" smtClean="0"/>
+              <a:t/>
+            </a:r>
+            <a:br>
+              <a:rPr lang="fr-FR" dirty="0" smtClean="0"/>
+            </a:br>
+            <a:r>
+              <a:rPr lang="fr-FR" sz="2800" dirty="0" smtClean="0"/>
+              <a:t>Multi-</a:t>
+            </a:r>
+            <a:r>
+              <a:rPr lang="fr-FR" sz="2800" dirty="0" err="1" smtClean="0"/>
+              <a:t>Dimensional</a:t>
+            </a:r>
+            <a:r>
+              <a:rPr lang="fr-FR" sz="2800" dirty="0" smtClean="0"/>
+              <a:t> </a:t>
+            </a:r>
+            <a:r>
+              <a:rPr lang="fr-FR" sz="2800" dirty="0" err="1" smtClean="0"/>
+              <a:t>Scaling</a:t>
+            </a:r>
+            <a:r>
+              <a:rPr lang="fr-FR" sz="2800" dirty="0" smtClean="0"/>
+              <a:t> and </a:t>
+            </a:r>
+            <a:r>
+              <a:rPr lang="fr-FR" sz="2800" dirty="0" err="1" smtClean="0"/>
+              <a:t>kMedoid</a:t>
+            </a:r>
+            <a:r>
+              <a:rPr lang="fr-FR" sz="2800" dirty="0" smtClean="0"/>
+              <a:t> </a:t>
+            </a:r>
+            <a:r>
+              <a:rPr lang="fr-FR" sz="2800" dirty="0" err="1" smtClean="0"/>
+              <a:t>Clustering</a:t>
+            </a:r>
+            <a:endParaRPr lang="fr-FR" sz="2800" dirty="0"/>
           </a:p>
         </p:txBody>
       </p:sp>
     </p:spTree>
     <p:extLst>
       <p:ext uri="{BB962C8B-B14F-4D97-AF65-F5344CB8AC3E}">
-        <p14:creationId xmlns:p14="http://schemas.microsoft.com/office/powerpoint/2010/main" val="2859419064"/>
+        <p14:creationId xmlns:p14="http://schemas.microsoft.com/office/powerpoint/2010/main" val="540028329"/>
       </p:ext>
     </p:extLst>
   </p:cSld>
@@ -4220,6 +4328,300 @@
       </p:grpSpPr>
       <p:sp>
         <p:nvSpPr>
+          <p:cNvPr id="2" name="Espace réservé du contenu 1"/>
+          <p:cNvSpPr>
+            <a:spLocks noGrp="1"/>
+          </p:cNvSpPr>
+          <p:nvPr>
+            <p:ph idx="1"/>
+          </p:nvPr>
+        </p:nvSpPr>
+        <p:spPr/>
+        <p:txBody>
+          <a:bodyPr/>
+          <a:lstStyle/>
+          <a:p>
+            <a:endParaRPr lang="fr-FR"/>
+          </a:p>
+        </p:txBody>
+      </p:sp>
+      <p:sp>
+        <p:nvSpPr>
+          <p:cNvPr id="3" name="Titre 2"/>
+          <p:cNvSpPr>
+            <a:spLocks noGrp="1"/>
+          </p:cNvSpPr>
+          <p:nvPr>
+            <p:ph type="title"/>
+          </p:nvPr>
+        </p:nvSpPr>
+        <p:spPr/>
+        <p:txBody>
+          <a:bodyPr/>
+          <a:lstStyle/>
+          <a:p>
+            <a:r>
+              <a:rPr lang="fr-FR" sz="4000" dirty="0" err="1" smtClean="0"/>
+              <a:t>Reflections</a:t>
+            </a:r>
+            <a:endParaRPr lang="fr-FR" sz="4000" dirty="0"/>
+          </a:p>
+        </p:txBody>
+      </p:sp>
+    </p:spTree>
+    <p:extLst>
+      <p:ext uri="{BB962C8B-B14F-4D97-AF65-F5344CB8AC3E}">
+        <p14:creationId xmlns:p14="http://schemas.microsoft.com/office/powerpoint/2010/main" val="2555832873"/>
+      </p:ext>
+    </p:extLst>
+  </p:cSld>
+  <p:clrMapOvr>
+    <a:masterClrMapping/>
+  </p:clrMapOvr>
+</p:sld>
+</file>
+
+<file path=ppt/slides/slide15.xml><?xml version="1.0" encoding="utf-8"?>
+<p:sld xmlns:a="http://schemas.openxmlformats.org/drawingml/2006/main" xmlns:r="http://schemas.openxmlformats.org/officeDocument/2006/relationships" xmlns:p="http://schemas.openxmlformats.org/presentationml/2006/main">
+  <p:cSld>
+    <p:spTree>
+      <p:nvGrpSpPr>
+        <p:cNvPr id="1" name=""/>
+        <p:cNvGrpSpPr/>
+        <p:nvPr/>
+      </p:nvGrpSpPr>
+      <p:grpSpPr>
+        <a:xfrm>
+          <a:off x="0" y="0"/>
+          <a:ext cx="0" cy="0"/>
+          <a:chOff x="0" y="0"/>
+          <a:chExt cx="0" cy="0"/>
+        </a:xfrm>
+      </p:grpSpPr>
+      <p:sp>
+        <p:nvSpPr>
+          <p:cNvPr id="3" name="Espace réservé du contenu 2"/>
+          <p:cNvSpPr>
+            <a:spLocks noGrp="1"/>
+          </p:cNvSpPr>
+          <p:nvPr>
+            <p:ph idx="1"/>
+          </p:nvPr>
+        </p:nvSpPr>
+        <p:spPr/>
+        <p:txBody>
+          <a:bodyPr/>
+          <a:lstStyle/>
+          <a:p>
+            <a:pPr>
+              <a:buFont typeface="Arial"/>
+              <a:buChar char="•"/>
+            </a:pPr>
+            <a:r>
+              <a:rPr lang="fr-FR" dirty="0" err="1" smtClean="0"/>
+              <a:t>Apply</a:t>
+            </a:r>
+            <a:r>
+              <a:rPr lang="fr-FR" dirty="0" smtClean="0"/>
+              <a:t> p-</a:t>
+            </a:r>
+            <a:r>
+              <a:rPr lang="fr-FR" dirty="0" err="1" smtClean="0"/>
+              <a:t>Wasserstein</a:t>
+            </a:r>
+            <a:r>
+              <a:rPr lang="fr-FR" dirty="0" smtClean="0"/>
+              <a:t> </a:t>
+            </a:r>
+            <a:r>
+              <a:rPr lang="fr-FR" dirty="0" err="1" smtClean="0"/>
+              <a:t>Metric</a:t>
+            </a:r>
+            <a:r>
+              <a:rPr lang="fr-FR" dirty="0" smtClean="0"/>
+              <a:t>.</a:t>
+            </a:r>
+          </a:p>
+          <a:p>
+            <a:pPr>
+              <a:buFont typeface="Arial"/>
+              <a:buChar char="•"/>
+            </a:pPr>
+            <a:r>
+              <a:rPr lang="fr-FR" dirty="0" err="1" smtClean="0"/>
+              <a:t>Introduce</a:t>
+            </a:r>
+            <a:r>
+              <a:rPr lang="fr-FR" dirty="0" smtClean="0"/>
+              <a:t> </a:t>
+            </a:r>
+            <a:r>
+              <a:rPr lang="fr-FR" dirty="0" err="1" smtClean="0"/>
+              <a:t>cut</a:t>
+            </a:r>
+            <a:r>
+              <a:rPr lang="fr-FR" dirty="0" smtClean="0"/>
+              <a:t> off for </a:t>
+            </a:r>
+            <a:r>
+              <a:rPr lang="fr-FR" dirty="0" err="1" smtClean="0"/>
+              <a:t>intesity</a:t>
+            </a:r>
+            <a:r>
+              <a:rPr lang="fr-FR" dirty="0" smtClean="0"/>
+              <a:t> </a:t>
+            </a:r>
+            <a:r>
+              <a:rPr lang="fr-FR" dirty="0" err="1" smtClean="0"/>
+              <a:t>with</a:t>
+            </a:r>
+            <a:r>
+              <a:rPr lang="fr-FR" dirty="0" smtClean="0"/>
+              <a:t> chroma </a:t>
+            </a:r>
+            <a:r>
+              <a:rPr lang="fr-FR" dirty="0" err="1" smtClean="0"/>
+              <a:t>features</a:t>
+            </a:r>
+            <a:r>
+              <a:rPr lang="fr-FR" dirty="0" smtClean="0"/>
+              <a:t>.</a:t>
+            </a:r>
+          </a:p>
+          <a:p>
+            <a:pPr>
+              <a:buFont typeface="Arial"/>
+              <a:buChar char="•"/>
+            </a:pPr>
+            <a:r>
+              <a:rPr lang="fr-FR" dirty="0" smtClean="0"/>
+              <a:t>Use </a:t>
+            </a:r>
+            <a:r>
+              <a:rPr lang="fr-FR" dirty="0" err="1" smtClean="0"/>
+              <a:t>true</a:t>
+            </a:r>
+            <a:r>
+              <a:rPr lang="fr-FR" dirty="0" smtClean="0"/>
+              <a:t> pitch composition </a:t>
+            </a:r>
+            <a:r>
+              <a:rPr lang="fr-FR" dirty="0" err="1" smtClean="0"/>
+              <a:t>instead</a:t>
+            </a:r>
+            <a:r>
+              <a:rPr lang="fr-FR" dirty="0" smtClean="0"/>
+              <a:t> of chroma </a:t>
+            </a:r>
+            <a:r>
+              <a:rPr lang="fr-FR" dirty="0" err="1" smtClean="0"/>
+              <a:t>features</a:t>
+            </a:r>
+            <a:r>
+              <a:rPr lang="fr-FR" dirty="0" smtClean="0"/>
+              <a:t>. </a:t>
+            </a:r>
+          </a:p>
+          <a:p>
+            <a:pPr>
+              <a:buFont typeface="Arial"/>
+              <a:buChar char="•"/>
+            </a:pPr>
+            <a:r>
+              <a:rPr lang="fr-FR" dirty="0" smtClean="0"/>
+              <a:t>Train on </a:t>
+            </a:r>
+            <a:r>
+              <a:rPr lang="fr-FR" dirty="0" err="1" smtClean="0"/>
+              <a:t>fundemental</a:t>
+            </a:r>
+            <a:r>
+              <a:rPr lang="fr-FR" dirty="0" smtClean="0"/>
+              <a:t> </a:t>
+            </a:r>
+            <a:r>
+              <a:rPr lang="fr-FR" dirty="0" err="1" smtClean="0"/>
+              <a:t>chords</a:t>
+            </a:r>
+            <a:r>
+              <a:rPr lang="fr-FR" dirty="0" smtClean="0"/>
+              <a:t>, </a:t>
+            </a:r>
+            <a:r>
+              <a:rPr lang="fr-FR" dirty="0" err="1" smtClean="0"/>
+              <a:t>chord</a:t>
+            </a:r>
+            <a:r>
+              <a:rPr lang="fr-FR" dirty="0" smtClean="0"/>
+              <a:t> progressions, time signatures, and </a:t>
+            </a:r>
+            <a:r>
+              <a:rPr lang="fr-FR" dirty="0" err="1" smtClean="0"/>
+              <a:t>introduce</a:t>
+            </a:r>
+            <a:r>
+              <a:rPr lang="fr-FR" dirty="0" smtClean="0"/>
+              <a:t> timbre. </a:t>
+            </a:r>
+            <a:endParaRPr lang="fr-FR" dirty="0"/>
+          </a:p>
+        </p:txBody>
+      </p:sp>
+      <p:sp>
+        <p:nvSpPr>
+          <p:cNvPr id="2" name="Titre 1"/>
+          <p:cNvSpPr>
+            <a:spLocks noGrp="1"/>
+          </p:cNvSpPr>
+          <p:nvPr>
+            <p:ph type="title"/>
+          </p:nvPr>
+        </p:nvSpPr>
+        <p:spPr/>
+        <p:txBody>
+          <a:bodyPr/>
+          <a:lstStyle/>
+          <a:p>
+            <a:r>
+              <a:rPr lang="fr-FR" dirty="0" smtClean="0"/>
+              <a:t>Future Directions</a:t>
+            </a:r>
+            <a:endParaRPr lang="fr-FR" dirty="0"/>
+          </a:p>
+        </p:txBody>
+      </p:sp>
+    </p:spTree>
+    <p:extLst>
+      <p:ext uri="{BB962C8B-B14F-4D97-AF65-F5344CB8AC3E}">
+        <p14:creationId xmlns:p14="http://schemas.microsoft.com/office/powerpoint/2010/main" val="2859419064"/>
+      </p:ext>
+    </p:extLst>
+  </p:cSld>
+  <p:clrMapOvr>
+    <a:masterClrMapping/>
+  </p:clrMapOvr>
+</p:sld>
+</file>
+
+<file path=ppt/slides/slide16.xml><?xml version="1.0" encoding="utf-8"?>
+<p:sld xmlns:a="http://schemas.openxmlformats.org/drawingml/2006/main" xmlns:r="http://schemas.openxmlformats.org/officeDocument/2006/relationships" xmlns:p="http://schemas.openxmlformats.org/presentationml/2006/main">
+  <p:cSld>
+    <p:spTree>
+      <p:nvGrpSpPr>
+        <p:cNvPr id="1" name=""/>
+        <p:cNvGrpSpPr/>
+        <p:nvPr/>
+      </p:nvGrpSpPr>
+      <p:grpSpPr>
+        <a:xfrm>
+          <a:off x="0" y="0"/>
+          <a:ext cx="0" cy="0"/>
+          <a:chOff x="0" y="0"/>
+          <a:chExt cx="0" cy="0"/>
+        </a:xfrm>
+      </p:grpSpPr>
+      <p:sp>
+        <p:nvSpPr>
           <p:cNvPr id="3" name="Espace réservé du contenu 2"/>
           <p:cNvSpPr>
             <a:spLocks noGrp="1"/>
@@ -4273,7 +4675,7 @@
 </p:sld>
 </file>
 
-<file path=ppt/slides/slide15.xml><?xml version="1.0" encoding="utf-8"?>
+<file path=ppt/slides/slide17.xml><?xml version="1.0" encoding="utf-8"?>
 <p:sld xmlns:a="http://schemas.openxmlformats.org/drawingml/2006/main" xmlns:r="http://schemas.openxmlformats.org/officeDocument/2006/relationships" xmlns:p="http://schemas.openxmlformats.org/presentationml/2006/main">
   <p:cSld>
     <p:spTree>
@@ -4397,8 +4799,8 @@
           <a:lstStyle/>
           <a:p>
             <a:r>
-              <a:rPr lang="fr-FR" dirty="0" err="1" smtClean="0"/>
-              <a:t>Incentive</a:t>
+              <a:rPr lang="fr-FR" dirty="0" smtClean="0"/>
+              <a:t>Background</a:t>
             </a:r>
             <a:endParaRPr lang="fr-FR" dirty="0"/>
           </a:p>
@@ -4407,7 +4809,7 @@
     </p:spTree>
     <p:extLst>
       <p:ext uri="{BB962C8B-B14F-4D97-AF65-F5344CB8AC3E}">
-        <p14:creationId xmlns:p14="http://schemas.microsoft.com/office/powerpoint/2010/main" val="814014933"/>
+        <p14:creationId xmlns:p14="http://schemas.microsoft.com/office/powerpoint/2010/main" val="4007005319"/>
       </p:ext>
     </p:extLst>
   </p:cSld>
@@ -4444,12 +4846,88 @@
             <p:ph idx="1"/>
           </p:nvPr>
         </p:nvSpPr>
-        <p:spPr/>
-        <p:txBody>
-          <a:bodyPr/>
-          <a:lstStyle/>
-          <a:p>
-            <a:endParaRPr lang="fr-FR"/>
+        <p:spPr>
+          <a:xfrm>
+            <a:off x="1828800" y="685801"/>
+            <a:ext cx="6400800" cy="3657599"/>
+          </a:xfrm>
+        </p:spPr>
+        <p:txBody>
+          <a:bodyPr/>
+          <a:lstStyle/>
+          <a:p>
+            <a:pPr>
+              <a:buFont typeface="Arial"/>
+              <a:buChar char="•"/>
+            </a:pPr>
+            <a:r>
+              <a:rPr lang="fr-FR" dirty="0" err="1" smtClean="0"/>
+              <a:t>Demonstrate</a:t>
+            </a:r>
+            <a:r>
+              <a:rPr lang="fr-FR" dirty="0" smtClean="0"/>
+              <a:t> a </a:t>
+            </a:r>
+            <a:r>
+              <a:rPr lang="fr-FR" dirty="0" err="1" smtClean="0"/>
+              <a:t>novel</a:t>
+            </a:r>
+            <a:r>
+              <a:rPr lang="fr-FR" dirty="0" smtClean="0"/>
+              <a:t> </a:t>
+            </a:r>
+            <a:r>
+              <a:rPr lang="fr-FR" dirty="0" err="1" smtClean="0"/>
+              <a:t>means</a:t>
+            </a:r>
+            <a:r>
+              <a:rPr lang="fr-FR" dirty="0" smtClean="0"/>
+              <a:t> of </a:t>
+            </a:r>
+            <a:r>
+              <a:rPr lang="fr-FR" dirty="0" err="1" smtClean="0"/>
+              <a:t>song</a:t>
+            </a:r>
+            <a:r>
+              <a:rPr lang="fr-FR" dirty="0" smtClean="0"/>
+              <a:t> classification.</a:t>
+            </a:r>
+          </a:p>
+          <a:p>
+            <a:pPr>
+              <a:buFont typeface="Arial"/>
+              <a:buChar char="•"/>
+            </a:pPr>
+            <a:r>
+              <a:rPr lang="fr-FR" dirty="0" err="1" smtClean="0"/>
+              <a:t>Provide</a:t>
+            </a:r>
+            <a:r>
+              <a:rPr lang="fr-FR" dirty="0" smtClean="0"/>
+              <a:t> a new perspective to </a:t>
+            </a:r>
+            <a:r>
+              <a:rPr lang="fr-FR" dirty="0" err="1" smtClean="0"/>
+              <a:t>studying</a:t>
+            </a:r>
+            <a:r>
+              <a:rPr lang="fr-FR" dirty="0" smtClean="0"/>
+              <a:t> music composition.</a:t>
+            </a:r>
+          </a:p>
+          <a:p>
+            <a:pPr>
+              <a:buFont typeface="Arial"/>
+              <a:buChar char="•"/>
+            </a:pPr>
+            <a:endParaRPr lang="fr-FR" dirty="0" smtClean="0"/>
+          </a:p>
+          <a:p>
+            <a:pPr>
+              <a:buFont typeface="Arial"/>
+              <a:buChar char="•"/>
+            </a:pPr>
+            <a:endParaRPr lang="fr-FR" dirty="0"/>
           </a:p>
         </p:txBody>
       </p:sp>
@@ -4470,7 +4948,7 @@
           <a:p>
             <a:r>
               <a:rPr lang="fr-FR" dirty="0" smtClean="0"/>
-              <a:t>Background</a:t>
+              <a:t>Motivation</a:t>
             </a:r>
             <a:endParaRPr lang="fr-FR" dirty="0"/>
           </a:p>
@@ -4479,7 +4957,7 @@
     </p:spTree>
     <p:extLst>
       <p:ext uri="{BB962C8B-B14F-4D97-AF65-F5344CB8AC3E}">
-        <p14:creationId xmlns:p14="http://schemas.microsoft.com/office/powerpoint/2010/main" val="4007005319"/>
+        <p14:creationId xmlns:p14="http://schemas.microsoft.com/office/powerpoint/2010/main" val="814014933"/>
       </p:ext>
     </p:extLst>
   </p:cSld>
@@ -4516,12 +4994,45 @@
             <p:ph idx="1"/>
           </p:nvPr>
         </p:nvSpPr>
-        <p:spPr/>
-        <p:txBody>
-          <a:bodyPr/>
-          <a:lstStyle/>
-          <a:p>
-            <a:endParaRPr lang="fr-FR"/>
+        <p:spPr>
+          <a:xfrm>
+            <a:off x="1612900" y="685801"/>
+            <a:ext cx="6616700" cy="3657599"/>
+          </a:xfrm>
+        </p:spPr>
+        <p:txBody>
+          <a:bodyPr/>
+          <a:lstStyle/>
+          <a:p>
+            <a:pPr>
+              <a:buFont typeface="Arial"/>
+              <a:buChar char="•"/>
+            </a:pPr>
+            <a:r>
+              <a:rPr lang="fr-FR" dirty="0" err="1" smtClean="0"/>
+              <a:t>View</a:t>
+            </a:r>
+            <a:r>
+              <a:rPr lang="fr-FR" dirty="0" smtClean="0"/>
+              <a:t> music in </a:t>
+            </a:r>
+            <a:r>
+              <a:rPr lang="fr-FR" dirty="0" err="1" smtClean="0"/>
+              <a:t>terms</a:t>
+            </a:r>
+            <a:r>
+              <a:rPr lang="fr-FR" dirty="0" smtClean="0"/>
+              <a:t> of pitch, </a:t>
+            </a:r>
+            <a:r>
+              <a:rPr lang="fr-FR" dirty="0" err="1" smtClean="0"/>
+              <a:t>intensity</a:t>
+            </a:r>
+            <a:r>
+              <a:rPr lang="fr-FR" dirty="0" smtClean="0"/>
+              <a:t>, and time signatures.</a:t>
+            </a:r>
+            <a:endParaRPr lang="fr-FR" dirty="0"/>
           </a:p>
         </p:txBody>
       </p:sp>
@@ -4597,7 +5108,41 @@
           <a:bodyPr/>
           <a:lstStyle/>
           <a:p>
-            <a:endParaRPr lang="fr-FR"/>
+            <a:pPr>
+              <a:buFont typeface="Arial"/>
+              <a:buChar char="•"/>
+            </a:pPr>
+            <a:r>
+              <a:rPr lang="fr-FR" dirty="0" smtClean="0"/>
+              <a:t>Initial </a:t>
+            </a:r>
+            <a:r>
+              <a:rPr lang="fr-FR" dirty="0" err="1" smtClean="0"/>
+              <a:t>ideas</a:t>
+            </a:r>
+            <a:r>
+              <a:rPr lang="fr-FR" dirty="0" smtClean="0"/>
+              <a:t>: </a:t>
+            </a:r>
+          </a:p>
+          <a:p>
+            <a:pPr>
+              <a:buFont typeface="Arial"/>
+              <a:buChar char="•"/>
+            </a:pPr>
+            <a:r>
+              <a:rPr lang="fr-FR" dirty="0" smtClean="0"/>
+              <a:t>Chroma </a:t>
+            </a:r>
+            <a:r>
+              <a:rPr lang="fr-FR" dirty="0" err="1" smtClean="0"/>
+              <a:t>Features</a:t>
+            </a:r>
+            <a:r>
+              <a:rPr lang="fr-FR" dirty="0" smtClean="0"/>
+              <a:t>.</a:t>
+            </a:r>
+            <a:endParaRPr lang="fr-FR" dirty="0"/>
           </a:p>
         </p:txBody>
       </p:sp>
@@ -4619,6 +5164,10 @@
             <a:r>
               <a:rPr lang="fr-FR" dirty="0" err="1" smtClean="0"/>
               <a:t>Approach</a:t>
+            </a:r>
+            <a:r>
+              <a:rPr lang="fr-FR" dirty="0" smtClean="0"/>
+              <a:t>: Data</a:t>
             </a:r>
             <a:endParaRPr lang="fr-FR" dirty="0"/>
           </a:p>
@@ -4669,7 +5218,23 @@
           <a:bodyPr/>
           <a:lstStyle/>
           <a:p>
-            <a:endParaRPr lang="fr-FR"/>
+            <a:pPr>
+              <a:buFont typeface="Arial"/>
+              <a:buChar char="•"/>
+            </a:pPr>
+            <a:r>
+              <a:rPr lang="fr-FR" dirty="0" smtClean="0"/>
+              <a:t>Chroma </a:t>
+            </a:r>
+            <a:r>
+              <a:rPr lang="fr-FR" dirty="0" err="1" smtClean="0"/>
+              <a:t>Features</a:t>
+            </a:r>
+            <a:r>
+              <a:rPr lang="fr-FR" dirty="0" smtClean="0"/>
+              <a:t>.</a:t>
+            </a:r>
+            <a:endParaRPr lang="fr-FR" dirty="0"/>
           </a:p>
         </p:txBody>
       </p:sp>
@@ -4738,10 +5303,269 @@
         </p:nvSpPr>
         <p:spPr/>
         <p:txBody>
-          <a:bodyPr/>
-          <a:lstStyle/>
-          <a:p>
-            <a:endParaRPr lang="fr-FR"/>
+          <a:bodyPr>
+            <a:normAutofit lnSpcReduction="10000"/>
+          </a:bodyPr>
+          <a:lstStyle/>
+          <a:p>
+            <a:pPr marL="475488" indent="-457200">
+              <a:buFont typeface="+mj-lt"/>
+              <a:buAutoNum type="arabicPeriod"/>
+            </a:pPr>
+            <a:r>
+              <a:rPr lang="fr-FR" dirty="0" smtClean="0"/>
+              <a:t>Data </a:t>
+            </a:r>
+            <a:r>
+              <a:rPr lang="fr-FR" dirty="0" err="1" smtClean="0"/>
+              <a:t>Mining</a:t>
+            </a:r>
+            <a:r>
+              <a:rPr lang="fr-FR" dirty="0" smtClean="0"/>
+              <a:t>: </a:t>
+            </a:r>
+            <a:r>
+              <a:rPr lang="fr-FR" dirty="0" err="1" smtClean="0"/>
+              <a:t>Obtain</a:t>
+            </a:r>
+            <a:r>
+              <a:rPr lang="fr-FR" dirty="0" smtClean="0"/>
+              <a:t> Chroma </a:t>
+            </a:r>
+            <a:r>
+              <a:rPr lang="fr-FR" dirty="0" err="1" smtClean="0"/>
+              <a:t>Features</a:t>
+            </a:r>
+            <a:r>
+              <a:rPr lang="fr-FR" dirty="0" smtClean="0"/>
+              <a:t> of </a:t>
+            </a:r>
+            <a:r>
+              <a:rPr lang="fr-FR" dirty="0" err="1" smtClean="0"/>
+              <a:t>Songs</a:t>
+            </a:r>
+            <a:r>
+              <a:rPr lang="fr-FR" dirty="0" smtClean="0"/>
+              <a:t>.</a:t>
+            </a:r>
+            <a:endParaRPr lang="fr-FR" dirty="0"/>
+          </a:p>
+          <a:p>
+            <a:pPr marL="475488" indent="-457200">
+              <a:buFont typeface="+mj-lt"/>
+              <a:buAutoNum type="arabicPeriod"/>
+            </a:pPr>
+            <a:r>
+              <a:rPr lang="fr-FR" dirty="0" err="1" smtClean="0"/>
+              <a:t>Compute</a:t>
+            </a:r>
+            <a:r>
+              <a:rPr lang="fr-FR" dirty="0" smtClean="0"/>
+              <a:t> </a:t>
+            </a:r>
+            <a:r>
+              <a:rPr lang="fr-FR" dirty="0" err="1" smtClean="0"/>
+              <a:t>homological</a:t>
+            </a:r>
+            <a:r>
+              <a:rPr lang="fr-FR" dirty="0" smtClean="0"/>
+              <a:t> </a:t>
+            </a:r>
+            <a:r>
+              <a:rPr lang="fr-FR" dirty="0" err="1" smtClean="0"/>
+              <a:t>features</a:t>
+            </a:r>
+            <a:r>
+              <a:rPr lang="fr-FR" dirty="0" smtClean="0"/>
+              <a:t> in chroma </a:t>
+            </a:r>
+            <a:r>
+              <a:rPr lang="fr-FR" dirty="0" err="1" smtClean="0"/>
+              <a:t>features</a:t>
+            </a:r>
+            <a:r>
+              <a:rPr lang="fr-FR" dirty="0" smtClean="0"/>
+              <a:t> via </a:t>
+            </a:r>
+            <a:r>
+              <a:rPr lang="fr-FR" dirty="0" err="1" smtClean="0"/>
+              <a:t>persistence</a:t>
+            </a:r>
+            <a:r>
+              <a:rPr lang="fr-FR" dirty="0" smtClean="0"/>
+              <a:t>.</a:t>
+            </a:r>
+          </a:p>
+          <a:p>
+            <a:pPr marL="475488" indent="-457200">
+              <a:buFont typeface="+mj-lt"/>
+              <a:buAutoNum type="arabicPeriod"/>
+            </a:pPr>
+            <a:r>
+              <a:rPr lang="fr-FR" dirty="0" err="1" smtClean="0"/>
+              <a:t>Obtain</a:t>
+            </a:r>
+            <a:r>
+              <a:rPr lang="fr-FR" dirty="0" smtClean="0"/>
+              <a:t> pair-</a:t>
+            </a:r>
+            <a:r>
+              <a:rPr lang="fr-FR" dirty="0" err="1" smtClean="0"/>
+              <a:t>wise</a:t>
+            </a:r>
+            <a:r>
+              <a:rPr lang="fr-FR" dirty="0" smtClean="0"/>
+              <a:t> </a:t>
+            </a:r>
+            <a:r>
+              <a:rPr lang="fr-FR" dirty="0" err="1" smtClean="0"/>
+              <a:t>Bottleneck</a:t>
+            </a:r>
+            <a:r>
+              <a:rPr lang="fr-FR" dirty="0" smtClean="0"/>
+              <a:t> distances </a:t>
+            </a:r>
+            <a:r>
+              <a:rPr lang="fr-FR" dirty="0" err="1" smtClean="0"/>
+              <a:t>between</a:t>
+            </a:r>
+            <a:r>
+              <a:rPr lang="fr-FR" dirty="0" smtClean="0"/>
+              <a:t> </a:t>
+            </a:r>
+            <a:r>
+              <a:rPr lang="fr-FR" dirty="0" err="1" smtClean="0"/>
+              <a:t>persistence</a:t>
+            </a:r>
+            <a:r>
+              <a:rPr lang="fr-FR" dirty="0" smtClean="0"/>
+              <a:t> </a:t>
+            </a:r>
+            <a:r>
+              <a:rPr lang="fr-FR" dirty="0" err="1" smtClean="0"/>
+              <a:t>diagrams</a:t>
+            </a:r>
+            <a:r>
+              <a:rPr lang="fr-FR" dirty="0" smtClean="0"/>
+              <a:t> of </a:t>
+            </a:r>
+            <a:r>
+              <a:rPr lang="fr-FR" dirty="0" err="1" smtClean="0"/>
+              <a:t>songs</a:t>
+            </a:r>
+            <a:r>
+              <a:rPr lang="fr-FR" dirty="0" smtClean="0"/>
+              <a:t>.</a:t>
+            </a:r>
+          </a:p>
+          <a:p>
+            <a:pPr marL="475488" indent="-457200">
+              <a:buFont typeface="+mj-lt"/>
+              <a:buAutoNum type="arabicPeriod"/>
+            </a:pPr>
+            <a:r>
+              <a:rPr lang="fr-FR" dirty="0" err="1" smtClean="0"/>
+              <a:t>Perform</a:t>
+            </a:r>
+            <a:r>
+              <a:rPr lang="fr-FR" dirty="0" smtClean="0"/>
+              <a:t> </a:t>
+            </a:r>
+            <a:r>
+              <a:rPr lang="fr-FR" dirty="0" err="1" smtClean="0"/>
+              <a:t>clustering</a:t>
+            </a:r>
+            <a:r>
+              <a:rPr lang="fr-FR" dirty="0" smtClean="0"/>
+              <a:t> </a:t>
+            </a:r>
+            <a:r>
+              <a:rPr lang="fr-FR" dirty="0" err="1" smtClean="0"/>
+              <a:t>based</a:t>
+            </a:r>
+            <a:r>
+              <a:rPr lang="fr-FR" dirty="0" smtClean="0"/>
+              <a:t> on pair-</a:t>
+            </a:r>
+            <a:r>
+              <a:rPr lang="fr-FR" dirty="0" err="1" smtClean="0"/>
+              <a:t>wise</a:t>
+            </a:r>
+            <a:r>
+              <a:rPr lang="fr-FR" dirty="0" smtClean="0"/>
+              <a:t> </a:t>
+            </a:r>
+            <a:r>
+              <a:rPr lang="fr-FR" dirty="0" err="1"/>
+              <a:t>B</a:t>
+            </a:r>
+            <a:r>
+              <a:rPr lang="fr-FR" dirty="0" err="1" smtClean="0"/>
+              <a:t>ottleneck</a:t>
+            </a:r>
+            <a:r>
+              <a:rPr lang="fr-FR" dirty="0" smtClean="0"/>
+              <a:t> distances.</a:t>
+            </a:r>
+          </a:p>
+          <a:p>
+            <a:pPr marL="475488" indent="-457200">
+              <a:buFont typeface="+mj-lt"/>
+              <a:buAutoNum type="arabicPeriod"/>
+            </a:pPr>
+            <a:r>
+              <a:rPr lang="fr-FR" dirty="0" err="1"/>
+              <a:t>P</a:t>
+            </a:r>
+            <a:r>
+              <a:rPr lang="fr-FR" dirty="0" err="1" smtClean="0"/>
+              <a:t>erform</a:t>
+            </a:r>
+            <a:r>
+              <a:rPr lang="fr-FR" dirty="0" smtClean="0"/>
+              <a:t> dimension </a:t>
+            </a:r>
+            <a:r>
+              <a:rPr lang="fr-FR" dirty="0" err="1" smtClean="0"/>
+              <a:t>reduction</a:t>
+            </a:r>
+            <a:r>
+              <a:rPr lang="fr-FR" dirty="0" smtClean="0"/>
+              <a:t> for visualisation.</a:t>
+            </a:r>
+          </a:p>
+          <a:p>
+            <a:pPr marL="475488" indent="-457200">
+              <a:buFont typeface="+mj-lt"/>
+              <a:buAutoNum type="arabicPeriod"/>
+            </a:pPr>
+            <a:r>
+              <a:rPr lang="fr-FR" dirty="0" smtClean="0"/>
+              <a:t>Asses </a:t>
+            </a:r>
+            <a:r>
+              <a:rPr lang="fr-FR" dirty="0" err="1" smtClean="0"/>
+              <a:t>success</a:t>
+            </a:r>
+            <a:r>
+              <a:rPr lang="fr-FR" dirty="0" smtClean="0"/>
+              <a:t> of </a:t>
+            </a:r>
+            <a:r>
+              <a:rPr lang="fr-FR" dirty="0" err="1" smtClean="0"/>
+              <a:t>found</a:t>
+            </a:r>
+            <a:r>
+              <a:rPr lang="fr-FR" dirty="0" smtClean="0"/>
+              <a:t> clusters.</a:t>
+            </a:r>
+          </a:p>
+          <a:p>
+            <a:pPr marL="475488" indent="-457200">
+              <a:buFont typeface="+mj-lt"/>
+              <a:buAutoNum type="arabicPeriod"/>
+            </a:pPr>
+            <a:endParaRPr lang="fr-FR" dirty="0" smtClean="0"/>
           </a:p>
         </p:txBody>
       </p:sp>
@@ -4755,24 +5579,37 @@
             <p:ph type="title"/>
           </p:nvPr>
         </p:nvSpPr>
-        <p:spPr/>
-        <p:txBody>
-          <a:bodyPr/>
-          <a:lstStyle/>
-          <a:p>
-            <a:r>
-              <a:rPr lang="fr-FR" dirty="0" err="1" smtClean="0"/>
+        <p:spPr>
+          <a:xfrm>
+            <a:off x="777240" y="4876800"/>
+            <a:ext cx="7934960" cy="914400"/>
+          </a:xfrm>
+        </p:spPr>
+        <p:txBody>
+          <a:bodyPr/>
+          <a:lstStyle/>
+          <a:p>
+            <a:r>
+              <a:rPr lang="fr-FR" sz="3600" dirty="0" err="1" smtClean="0"/>
+              <a:t>Summary</a:t>
+            </a:r>
+            <a:r>
+              <a:rPr lang="fr-FR" sz="3600" dirty="0" smtClean="0"/>
+              <a:t> of </a:t>
+            </a:r>
+            <a:r>
+              <a:rPr lang="fr-FR" sz="3600" dirty="0" err="1" smtClean="0"/>
               <a:t>Computational</a:t>
             </a:r>
             <a:r>
-              <a:rPr lang="fr-FR" dirty="0" smtClean="0"/>
+              <a:rPr lang="fr-FR" sz="3600" dirty="0" smtClean="0"/>
               <a:t> </a:t>
             </a:r>
             <a:r>
-              <a:rPr lang="fr-FR" dirty="0" err="1" smtClean="0"/>
+              <a:rPr lang="fr-FR" sz="3600" dirty="0" err="1" smtClean="0"/>
               <a:t>Methods</a:t>
             </a:r>
-            <a:endParaRPr lang="fr-FR" dirty="0"/>
+            <a:endParaRPr lang="fr-FR" sz="3600" dirty="0"/>
           </a:p>
         </p:txBody>
       </p:sp>
@@ -4816,12 +5653,49 @@
             <p:ph idx="1"/>
           </p:nvPr>
         </p:nvSpPr>
-        <p:spPr/>
-        <p:txBody>
-          <a:bodyPr/>
-          <a:lstStyle/>
-          <a:p>
-            <a:endParaRPr lang="fr-FR"/>
+        <p:spPr>
+          <a:xfrm>
+            <a:off x="1295400" y="1"/>
+            <a:ext cx="6934200" cy="2044699"/>
+          </a:xfrm>
+        </p:spPr>
+        <p:txBody>
+          <a:bodyPr>
+            <a:normAutofit/>
+          </a:bodyPr>
+          <a:lstStyle/>
+          <a:p>
+            <a:pPr>
+              <a:buFont typeface="Arial"/>
+              <a:buChar char="•"/>
+            </a:pPr>
+            <a:r>
+              <a:rPr lang="fr-FR" sz="2400" dirty="0" smtClean="0"/>
+              <a:t>Persistent </a:t>
+            </a:r>
+            <a:r>
+              <a:rPr lang="fr-FR" sz="2400" dirty="0" err="1" smtClean="0"/>
+              <a:t>Homology</a:t>
+            </a:r>
+            <a:r>
+              <a:rPr lang="fr-FR" sz="2400" dirty="0" smtClean="0"/>
+              <a:t> of chroma </a:t>
+            </a:r>
+            <a:r>
+              <a:rPr lang="fr-FR" sz="2400" dirty="0" err="1" smtClean="0"/>
+              <a:t>features</a:t>
+            </a:r>
+            <a:r>
+              <a:rPr lang="fr-FR" sz="2400" dirty="0" smtClean="0"/>
+              <a:t>.</a:t>
+            </a:r>
+          </a:p>
+          <a:p>
+            <a:pPr>
+              <a:buFont typeface="Arial"/>
+              <a:buChar char="•"/>
+            </a:pPr>
+            <a:endParaRPr lang="fr-FR" sz="2400" dirty="0" smtClean="0"/>
           </a:p>
         </p:txBody>
       </p:sp>
@@ -4835,7 +5709,12 @@
             <p:ph type="title"/>
           </p:nvPr>
         </p:nvSpPr>
-        <p:spPr/>
+        <p:spPr>
+          <a:xfrm>
+            <a:off x="777240" y="4876800"/>
+            <a:ext cx="7543800" cy="1282700"/>
+          </a:xfrm>
+        </p:spPr>
         <p:txBody>
           <a:bodyPr/>
           <a:lstStyle/>
@@ -4852,6 +5731,66 @@
           </a:p>
         </p:txBody>
       </p:sp>
+      <p:pic>
+        <p:nvPicPr>
+          <p:cNvPr id="4" name="Image 3" descr="specgram.pdf"/>
+          <p:cNvPicPr>
+            <a:picLocks noChangeAspect="1"/>
+          </p:cNvPicPr>
+          <p:nvPr/>
+        </p:nvPicPr>
+        <p:blipFill>
+          <a:blip r:embed="rId2">
+            <a:extLst>
+              <a:ext uri="{28A0092B-C50C-407E-A947-70E740481C1C}">
+                <a14:useLocalDpi xmlns:a14="http://schemas.microsoft.com/office/drawing/2010/main" val="0"/>
+              </a:ext>
+            </a:extLst>
+          </a:blip>
+          <a:stretch>
+            <a:fillRect/>
+          </a:stretch>
+        </p:blipFill>
+        <p:spPr>
+          <a:xfrm>
+            <a:off x="0" y="1562100"/>
+            <a:ext cx="3848100" cy="3848100"/>
+          </a:xfrm>
+          <a:prstGeom prst="rect">
+            <a:avLst/>
+          </a:prstGeom>
+        </p:spPr>
+      </p:pic>
+      <p:pic>
+        <p:nvPicPr>
+          <p:cNvPr id="6" name="Image 5" descr="persChroma.png"/>
+          <p:cNvPicPr>
+            <a:picLocks noChangeAspect="1"/>
+          </p:cNvPicPr>
+          <p:nvPr/>
+        </p:nvPicPr>
+        <p:blipFill>
+          <a:blip r:embed="rId3">
+            <a:extLst>
+              <a:ext uri="{28A0092B-C50C-407E-A947-70E740481C1C}">
+                <a14:useLocalDpi xmlns:a14="http://schemas.microsoft.com/office/drawing/2010/main" val="0"/>
+              </a:ext>
+            </a:extLst>
+          </a:blip>
+          <a:stretch>
+            <a:fillRect/>
+          </a:stretch>
+        </p:blipFill>
+        <p:spPr>
+          <a:xfrm>
+            <a:off x="3644900" y="609600"/>
+            <a:ext cx="5372100" cy="5372100"/>
+          </a:xfrm>
+          <a:prstGeom prst="rect">
+            <a:avLst/>
+          </a:prstGeom>
+        </p:spPr>
+      </p:pic>
     </p:spTree>
     <p:extLst>
       <p:ext uri="{BB962C8B-B14F-4D97-AF65-F5344CB8AC3E}">
@@ -4897,7 +5836,255 @@
           <a:bodyPr/>
           <a:lstStyle/>
           <a:p>
-            <a:endParaRPr lang="fr-FR"/>
+            <a:pPr>
+              <a:buFont typeface="Arial"/>
+              <a:buChar char="•"/>
+            </a:pPr>
+            <a:r>
+              <a:rPr lang="fr-FR" dirty="0" smtClean="0"/>
+              <a:t>Persistent </a:t>
+            </a:r>
+            <a:r>
+              <a:rPr lang="fr-FR" dirty="0" err="1" smtClean="0"/>
+              <a:t>Homology</a:t>
+            </a:r>
+            <a:r>
+              <a:rPr lang="fr-FR" dirty="0" smtClean="0"/>
+              <a:t> of chroma </a:t>
+            </a:r>
+            <a:r>
+              <a:rPr lang="fr-FR" dirty="0" err="1" smtClean="0"/>
+              <a:t>features</a:t>
+            </a:r>
+            <a:r>
+              <a:rPr lang="fr-FR" dirty="0" smtClean="0"/>
+              <a:t>.</a:t>
+            </a:r>
+          </a:p>
+          <a:p>
+            <a:pPr lvl="2">
+              <a:buFont typeface="Arial"/>
+              <a:buChar char="•"/>
+            </a:pPr>
+            <a:r>
+              <a:rPr lang="fr-FR" b="1" dirty="0" err="1" smtClean="0"/>
+              <a:t>Homological</a:t>
+            </a:r>
+            <a:r>
+              <a:rPr lang="fr-FR" b="1" dirty="0" smtClean="0"/>
+              <a:t> </a:t>
+            </a:r>
+            <a:r>
+              <a:rPr lang="fr-FR" b="1" dirty="0" err="1" smtClean="0"/>
+              <a:t>features</a:t>
+            </a:r>
+            <a:r>
+              <a:rPr lang="fr-FR" b="1" dirty="0" smtClean="0"/>
+              <a:t> </a:t>
+            </a:r>
+            <a:r>
+              <a:rPr lang="fr-FR" b="1" dirty="0" err="1" smtClean="0"/>
+              <a:t>reflect</a:t>
+            </a:r>
+            <a:r>
+              <a:rPr lang="fr-FR" dirty="0" smtClean="0"/>
+              <a:t> </a:t>
+            </a:r>
+            <a:r>
+              <a:rPr lang="fr-FR" dirty="0" err="1" smtClean="0"/>
+              <a:t>common</a:t>
+            </a:r>
+            <a:r>
+              <a:rPr lang="fr-FR" dirty="0" smtClean="0"/>
+              <a:t> </a:t>
+            </a:r>
+            <a:r>
+              <a:rPr lang="fr-FR" b="1" dirty="0" err="1" smtClean="0"/>
+              <a:t>composition</a:t>
+            </a:r>
+            <a:r>
+              <a:rPr lang="fr-FR" dirty="0" err="1" smtClean="0"/>
+              <a:t>al</a:t>
+            </a:r>
+            <a:r>
+              <a:rPr lang="fr-FR" dirty="0" smtClean="0"/>
+              <a:t> structures in </a:t>
+            </a:r>
+            <a:r>
+              <a:rPr lang="fr-FR" dirty="0" err="1" smtClean="0"/>
+              <a:t>songs</a:t>
+            </a:r>
+            <a:r>
+              <a:rPr lang="fr-FR" dirty="0" smtClean="0"/>
+              <a:t>.</a:t>
+            </a:r>
+          </a:p>
+          <a:p>
+            <a:pPr lvl="2">
+              <a:buFont typeface="Arial"/>
+              <a:buChar char="•"/>
+            </a:pPr>
+            <a:r>
+              <a:rPr lang="fr-FR" b="1" dirty="0" err="1" smtClean="0"/>
+              <a:t>Birth</a:t>
+            </a:r>
+            <a:r>
+              <a:rPr lang="fr-FR" b="1" dirty="0" smtClean="0"/>
+              <a:t> and </a:t>
+            </a:r>
+            <a:r>
+              <a:rPr lang="fr-FR" b="1" dirty="0" err="1" smtClean="0"/>
+              <a:t>Death</a:t>
+            </a:r>
+            <a:r>
+              <a:rPr lang="fr-FR" b="1" dirty="0" smtClean="0"/>
+              <a:t> times </a:t>
+            </a:r>
+            <a:r>
+              <a:rPr lang="fr-FR" dirty="0" smtClean="0"/>
+              <a:t>of </a:t>
+            </a:r>
+            <a:r>
+              <a:rPr lang="fr-FR" dirty="0" err="1" smtClean="0"/>
+              <a:t>homological</a:t>
+            </a:r>
+            <a:r>
+              <a:rPr lang="fr-FR" dirty="0" smtClean="0"/>
+              <a:t> </a:t>
+            </a:r>
+            <a:r>
+              <a:rPr lang="fr-FR" dirty="0" err="1" smtClean="0"/>
+              <a:t>features</a:t>
+            </a:r>
+            <a:r>
+              <a:rPr lang="fr-FR" dirty="0" smtClean="0"/>
+              <a:t> </a:t>
+            </a:r>
+            <a:r>
+              <a:rPr lang="fr-FR" b="1" dirty="0" err="1" smtClean="0"/>
+              <a:t>reflect</a:t>
+            </a:r>
+            <a:r>
+              <a:rPr lang="fr-FR" b="1" dirty="0" smtClean="0"/>
+              <a:t> time signatures </a:t>
+            </a:r>
+            <a:r>
+              <a:rPr lang="fr-FR" dirty="0" smtClean="0"/>
+              <a:t>of musical compositions. </a:t>
+            </a:r>
+          </a:p>
+          <a:p>
+            <a:pPr>
+              <a:buFont typeface="Arial"/>
+              <a:buChar char="•"/>
+            </a:pPr>
+            <a:r>
+              <a:rPr lang="fr-FR" dirty="0" err="1" smtClean="0"/>
+              <a:t>Bottleneck</a:t>
+            </a:r>
+            <a:r>
+              <a:rPr lang="fr-FR" dirty="0" smtClean="0"/>
+              <a:t> distance </a:t>
+            </a:r>
+            <a:r>
+              <a:rPr lang="fr-FR" dirty="0" err="1" smtClean="0"/>
+              <a:t>between</a:t>
+            </a:r>
+            <a:r>
+              <a:rPr lang="fr-FR" dirty="0" smtClean="0"/>
+              <a:t> </a:t>
+            </a:r>
+            <a:r>
+              <a:rPr lang="fr-FR" dirty="0" err="1" smtClean="0"/>
+              <a:t>persistence</a:t>
+            </a:r>
+            <a:r>
+              <a:rPr lang="fr-FR" dirty="0" smtClean="0"/>
+              <a:t> </a:t>
+            </a:r>
+            <a:r>
+              <a:rPr lang="fr-FR" dirty="0" err="1" smtClean="0"/>
+              <a:t>diagrams</a:t>
+            </a:r>
+            <a:r>
+              <a:rPr lang="fr-FR" dirty="0" smtClean="0"/>
+              <a:t> of </a:t>
+            </a:r>
+            <a:r>
+              <a:rPr lang="fr-FR" dirty="0" err="1" smtClean="0"/>
+              <a:t>songs</a:t>
+            </a:r>
+            <a:r>
+              <a:rPr lang="fr-FR" dirty="0" smtClean="0"/>
+              <a:t>.</a:t>
+            </a:r>
+          </a:p>
+          <a:p>
+            <a:pPr lvl="2">
+              <a:buFont typeface="Arial"/>
+              <a:buChar char="•"/>
+            </a:pPr>
+            <a:r>
+              <a:rPr lang="fr-FR" dirty="0" err="1" smtClean="0"/>
+              <a:t>Allow</a:t>
+            </a:r>
+            <a:r>
+              <a:rPr lang="fr-FR" dirty="0" smtClean="0"/>
+              <a:t> a </a:t>
+            </a:r>
+            <a:r>
+              <a:rPr lang="fr-FR" b="1" dirty="0" err="1" smtClean="0"/>
+              <a:t>measure</a:t>
+            </a:r>
+            <a:r>
+              <a:rPr lang="fr-FR" b="1" dirty="0" smtClean="0"/>
+              <a:t> of </a:t>
+            </a:r>
+            <a:r>
+              <a:rPr lang="fr-FR" b="1" dirty="0" err="1" smtClean="0"/>
+              <a:t>similarity</a:t>
+            </a:r>
+            <a:r>
+              <a:rPr lang="fr-FR" b="1" dirty="0" smtClean="0"/>
+              <a:t> </a:t>
+            </a:r>
+            <a:r>
+              <a:rPr lang="fr-FR" b="1" dirty="0" err="1" smtClean="0"/>
+              <a:t>between</a:t>
+            </a:r>
+            <a:r>
+              <a:rPr lang="fr-FR" b="1" dirty="0" smtClean="0"/>
+              <a:t> </a:t>
+            </a:r>
+            <a:r>
+              <a:rPr lang="fr-FR" dirty="0" smtClean="0"/>
+              <a:t>structure of </a:t>
+            </a:r>
+            <a:r>
+              <a:rPr lang="fr-FR" b="1" dirty="0" err="1" smtClean="0"/>
+              <a:t>song</a:t>
+            </a:r>
+            <a:r>
+              <a:rPr lang="fr-FR" b="1" dirty="0" smtClean="0"/>
+              <a:t> compositions</a:t>
+            </a:r>
+            <a:r>
+              <a:rPr lang="fr-FR" dirty="0" smtClean="0"/>
+              <a:t>.</a:t>
+            </a:r>
+          </a:p>
+          <a:p>
+            <a:pPr marL="384048" lvl="1" indent="0">
+              <a:buNone/>
+            </a:pPr>
+            <a:endParaRPr lang="fr-FR" dirty="0" smtClean="0"/>
+          </a:p>
+          <a:p>
+            <a:pPr lvl="1">
+              <a:buFont typeface="Arial"/>
+              <a:buChar char="•"/>
+            </a:pPr>
+            <a:endParaRPr lang="fr-FR" dirty="0" smtClean="0"/>
           </a:p>
         </p:txBody>
       </p:sp>
@@ -4913,18 +6100,16 @@
         </p:nvSpPr>
         <p:spPr/>
         <p:txBody>
-          <a:bodyPr>
-            <a:normAutofit fontScale="90000"/>
-          </a:bodyPr>
-          <a:lstStyle/>
-          <a:p>
-            <a:r>
-              <a:rPr lang="fr-FR" dirty="0" smtClean="0"/>
-              <a:t>Machine Learning and </a:t>
-            </a:r>
-            <a:r>
-              <a:rPr lang="fr-FR" dirty="0" err="1" smtClean="0"/>
-              <a:t>Clustering</a:t>
+          <a:bodyPr/>
+          <a:lstStyle/>
+          <a:p>
+            <a:r>
+              <a:rPr lang="fr-FR" dirty="0" err="1" smtClean="0"/>
+              <a:t>Topological</a:t>
+            </a:r>
+            <a:r>
+              <a:rPr lang="fr-FR" dirty="0" smtClean="0"/>
+              <a:t> Aspects</a:t>
             </a:r>
             <a:endParaRPr lang="fr-FR" dirty="0"/>
           </a:p>
@@ -4933,7 +6118,7 @@
     </p:spTree>
     <p:extLst>
       <p:ext uri="{BB962C8B-B14F-4D97-AF65-F5344CB8AC3E}">
-        <p14:creationId xmlns:p14="http://schemas.microsoft.com/office/powerpoint/2010/main" val="2684406465"/>
+        <p14:creationId xmlns:p14="http://schemas.microsoft.com/office/powerpoint/2010/main" val="4160032454"/>
       </p:ext>
     </p:extLst>
   </p:cSld>

</xml_diff>